<commit_message>
Added info to demo slides.
</commit_message>
<xml_diff>
--- a/Election_Prediction_Presentation.pptx
+++ b/Election_Prediction_Presentation.pptx
@@ -125,6 +125,11 @@
       </a:defRPr>
     </a:lvl9pPr>
   </p:defaultTextStyle>
+  <p:extLst>
+    <p:ext uri="{EFAFB233-063F-42B5-8137-9DF3F51BA10A}">
+      <p15:sldGuideLst xmlns:p15="http://schemas.microsoft.com/office/powerpoint/2012/main"/>
+    </p:ext>
+  </p:extLst>
 </p:presentation>
 </file>
 
@@ -864,7 +869,7 @@
           <a:p>
             <a:fld id="{471319CA-78EC-4738-84A9-76031A37FFBE}" type="datetimeFigureOut">
               <a:rPr lang="en-US" smtClean="0"/>
-              <a:t>10-Sep-24</a:t>
+              <a:t>9/12/24</a:t>
             </a:fld>
             <a:endParaRPr lang="en-US"/>
           </a:p>
@@ -1062,7 +1067,7 @@
           <a:p>
             <a:fld id="{471319CA-78EC-4738-84A9-76031A37FFBE}" type="datetimeFigureOut">
               <a:rPr lang="en-US" smtClean="0"/>
-              <a:t>10-Sep-24</a:t>
+              <a:t>9/12/24</a:t>
             </a:fld>
             <a:endParaRPr lang="en-US"/>
           </a:p>
@@ -1270,7 +1275,7 @@
           <a:p>
             <a:fld id="{471319CA-78EC-4738-84A9-76031A37FFBE}" type="datetimeFigureOut">
               <a:rPr lang="en-US" smtClean="0"/>
-              <a:t>10-Sep-24</a:t>
+              <a:t>9/12/24</a:t>
             </a:fld>
             <a:endParaRPr lang="en-US"/>
           </a:p>
@@ -1468,7 +1473,7 @@
           <a:p>
             <a:fld id="{471319CA-78EC-4738-84A9-76031A37FFBE}" type="datetimeFigureOut">
               <a:rPr lang="en-US" smtClean="0"/>
-              <a:t>10-Sep-24</a:t>
+              <a:t>9/12/24</a:t>
             </a:fld>
             <a:endParaRPr lang="en-US"/>
           </a:p>
@@ -1743,7 +1748,7 @@
           <a:p>
             <a:fld id="{471319CA-78EC-4738-84A9-76031A37FFBE}" type="datetimeFigureOut">
               <a:rPr lang="en-US" smtClean="0"/>
-              <a:t>10-Sep-24</a:t>
+              <a:t>9/12/24</a:t>
             </a:fld>
             <a:endParaRPr lang="en-US"/>
           </a:p>
@@ -2008,7 +2013,7 @@
           <a:p>
             <a:fld id="{471319CA-78EC-4738-84A9-76031A37FFBE}" type="datetimeFigureOut">
               <a:rPr lang="en-US" smtClean="0"/>
-              <a:t>10-Sep-24</a:t>
+              <a:t>9/12/24</a:t>
             </a:fld>
             <a:endParaRPr lang="en-US"/>
           </a:p>
@@ -2420,7 +2425,7 @@
           <a:p>
             <a:fld id="{471319CA-78EC-4738-84A9-76031A37FFBE}" type="datetimeFigureOut">
               <a:rPr lang="en-US" smtClean="0"/>
-              <a:t>10-Sep-24</a:t>
+              <a:t>9/12/24</a:t>
             </a:fld>
             <a:endParaRPr lang="en-US"/>
           </a:p>
@@ -2561,7 +2566,7 @@
           <a:p>
             <a:fld id="{471319CA-78EC-4738-84A9-76031A37FFBE}" type="datetimeFigureOut">
               <a:rPr lang="en-US" smtClean="0"/>
-              <a:t>10-Sep-24</a:t>
+              <a:t>9/12/24</a:t>
             </a:fld>
             <a:endParaRPr lang="en-US"/>
           </a:p>
@@ -2674,7 +2679,7 @@
           <a:p>
             <a:fld id="{471319CA-78EC-4738-84A9-76031A37FFBE}" type="datetimeFigureOut">
               <a:rPr lang="en-US" smtClean="0"/>
-              <a:t>10-Sep-24</a:t>
+              <a:t>9/12/24</a:t>
             </a:fld>
             <a:endParaRPr lang="en-US"/>
           </a:p>
@@ -2985,7 +2990,7 @@
           <a:p>
             <a:fld id="{471319CA-78EC-4738-84A9-76031A37FFBE}" type="datetimeFigureOut">
               <a:rPr lang="en-US" smtClean="0"/>
-              <a:t>10-Sep-24</a:t>
+              <a:t>9/12/24</a:t>
             </a:fld>
             <a:endParaRPr lang="en-US"/>
           </a:p>
@@ -3273,7 +3278,7 @@
           <a:p>
             <a:fld id="{471319CA-78EC-4738-84A9-76031A37FFBE}" type="datetimeFigureOut">
               <a:rPr lang="en-US" smtClean="0"/>
-              <a:t>10-Sep-24</a:t>
+              <a:t>9/12/24</a:t>
             </a:fld>
             <a:endParaRPr lang="en-US"/>
           </a:p>
@@ -3524,7 +3529,7 @@
           <a:p>
             <a:fld id="{471319CA-78EC-4738-84A9-76031A37FFBE}" type="datetimeFigureOut">
               <a:rPr lang="en-US" smtClean="0"/>
-              <a:t>10-Sep-24</a:t>
+              <a:t>9/12/24</a:t>
             </a:fld>
             <a:endParaRPr lang="en-US"/>
           </a:p>
@@ -4003,16 +4008,92 @@
           </p:nvPr>
         </p:nvSpPr>
         <p:spPr>
+          <a:xfrm flipV="1">
+            <a:off x="788193" y="1448791"/>
+            <a:ext cx="10515600" cy="2161308"/>
+          </a:xfrm>
+        </p:spPr>
+        <p:txBody>
+          <a:bodyPr>
+            <a:normAutofit/>
+          </a:bodyPr>
+          <a:lstStyle/>
+          <a:p>
+            <a:r>
+              <a:rPr lang="en-US" dirty="0"/>
+              <a:t> </a:t>
+            </a:r>
+          </a:p>
+        </p:txBody>
+      </p:sp>
+      <p:sp>
+        <p:nvSpPr>
+          <p:cNvPr id="3" name="TextBox 2">
+            <a:extLst>
+              <a:ext uri="{FF2B5EF4-FFF2-40B4-BE49-F238E27FC236}">
+                <a16:creationId xmlns:a16="http://schemas.microsoft.com/office/drawing/2014/main" id="{0626FC26-4BC2-C365-ADE7-DD4B6CA5DF01}"/>
+              </a:ext>
+            </a:extLst>
+          </p:cNvPr>
+          <p:cNvSpPr txBox="1"/>
+          <p:nvPr/>
+        </p:nvSpPr>
+        <p:spPr>
           <a:xfrm>
-            <a:off x="788193" y="1722437"/>
-            <a:ext cx="10515600" cy="1325563"/>
-          </a:xfrm>
+            <a:off x="888207" y="2274838"/>
+            <a:ext cx="4512623" cy="2308324"/>
+          </a:xfrm>
+          <a:prstGeom prst="rect">
+            <a:avLst/>
+          </a:prstGeom>
+          <a:noFill/>
         </p:spPr>
         <p:txBody>
-          <a:bodyPr/>
-          <a:lstStyle/>
-          <a:p>
-            <a:endParaRPr lang="en-US"/>
+          <a:bodyPr wrap="square" rtlCol="0">
+            <a:spAutoFit/>
+          </a:bodyPr>
+          <a:lstStyle/>
+          <a:p>
+            <a:pPr>
+              <a:buFont typeface="Arial" panose="020B0604020202020204" pitchFamily="34" charset="0"/>
+              <a:buChar char="•"/>
+            </a:pPr>
+            <a:r>
+              <a:rPr lang="en-US" b="1" dirty="0"/>
+              <a:t>Age Distribution in Election Years</a:t>
+            </a:r>
+            <a:r>
+              <a:rPr lang="en-US" dirty="0"/>
+              <a:t>:</a:t>
+            </a:r>
+          </a:p>
+          <a:p>
+            <a:pPr>
+              <a:buFont typeface="Arial" panose="020B0604020202020204" pitchFamily="34" charset="0"/>
+              <a:buChar char="•"/>
+            </a:pPr>
+            <a:r>
+              <a:rPr lang="en-US" b="1" dirty="0"/>
+              <a:t>Median Age</a:t>
+            </a:r>
+            <a:r>
+              <a:rPr lang="en-US" dirty="0"/>
+              <a:t>: Remains consistently between 30 and 40 years across recent election years, showing little variation.</a:t>
+            </a:r>
+          </a:p>
+          <a:p>
+            <a:pPr>
+              <a:buFont typeface="Arial" panose="020B0604020202020204" pitchFamily="34" charset="0"/>
+              <a:buChar char="•"/>
+            </a:pPr>
+            <a:r>
+              <a:rPr lang="en-US" b="1" dirty="0"/>
+              <a:t>Age Distribution</a:t>
+            </a:r>
+            <a:r>
+              <a:rPr lang="en-US" dirty="0"/>
+              <a:t>: Percentages at the extremes of the age spectrum are relatively low, with most values clustering in the middle age range.</a:t>
+            </a:r>
           </a:p>
         </p:txBody>
       </p:sp>
@@ -7179,8 +7260,8 @@
         </p:nvSpPr>
         <p:spPr>
           <a:xfrm>
-            <a:off x="495300" y="1372393"/>
-            <a:ext cx="10515600" cy="1325563"/>
+            <a:off x="495300" y="1248230"/>
+            <a:ext cx="10515600" cy="1132114"/>
           </a:xfrm>
         </p:spPr>
         <p:txBody>
@@ -7190,6 +7271,103 @@
             <a:r>
               <a:rPr lang="en-US" dirty="0"/>
               <a:t>Demographic Analysis (EDA):</a:t>
+            </a:r>
+          </a:p>
+        </p:txBody>
+      </p:sp>
+      <p:pic>
+        <p:nvPicPr>
+          <p:cNvPr id="3" name="Picture 2">
+            <a:extLst>
+              <a:ext uri="{FF2B5EF4-FFF2-40B4-BE49-F238E27FC236}">
+                <a16:creationId xmlns:a16="http://schemas.microsoft.com/office/drawing/2014/main" id="{AD418411-5905-8091-1107-BFCD4A588810}"/>
+              </a:ext>
+            </a:extLst>
+          </p:cNvPr>
+          <p:cNvPicPr>
+            <a:picLocks noChangeAspect="1"/>
+          </p:cNvPicPr>
+          <p:nvPr/>
+        </p:nvPicPr>
+        <p:blipFill>
+          <a:blip r:embed="rId2"/>
+          <a:stretch>
+            <a:fillRect/>
+          </a:stretch>
+        </p:blipFill>
+        <p:spPr>
+          <a:xfrm>
+            <a:off x="726791" y="2039481"/>
+            <a:ext cx="5849461" cy="3945683"/>
+          </a:xfrm>
+          <a:prstGeom prst="rect">
+            <a:avLst/>
+          </a:prstGeom>
+        </p:spPr>
+      </p:pic>
+      <p:sp>
+        <p:nvSpPr>
+          <p:cNvPr id="4" name="TextBox 3">
+            <a:extLst>
+              <a:ext uri="{FF2B5EF4-FFF2-40B4-BE49-F238E27FC236}">
+                <a16:creationId xmlns:a16="http://schemas.microsoft.com/office/drawing/2014/main" id="{344D14DA-A7E9-2092-0A21-DECADE6C6D07}"/>
+              </a:ext>
+            </a:extLst>
+          </p:cNvPr>
+          <p:cNvSpPr txBox="1"/>
+          <p:nvPr/>
+        </p:nvSpPr>
+        <p:spPr>
+          <a:xfrm>
+            <a:off x="6807200" y="2380344"/>
+            <a:ext cx="4847771" cy="2031325"/>
+          </a:xfrm>
+          <a:prstGeom prst="rect">
+            <a:avLst/>
+          </a:prstGeom>
+          <a:noFill/>
+        </p:spPr>
+        <p:txBody>
+          <a:bodyPr wrap="square" rtlCol="0">
+            <a:spAutoFit/>
+          </a:bodyPr>
+          <a:lstStyle/>
+          <a:p>
+            <a:pPr>
+              <a:buFont typeface="Arial" panose="020B0604020202020204" pitchFamily="34" charset="0"/>
+              <a:buChar char="•"/>
+            </a:pPr>
+            <a:r>
+              <a:rPr lang="en-US" b="1" dirty="0"/>
+              <a:t>Racial Distribution in Election Years</a:t>
+            </a:r>
+            <a:r>
+              <a:rPr lang="en-US" dirty="0"/>
+              <a:t>:</a:t>
+            </a:r>
+          </a:p>
+          <a:p>
+            <a:pPr>
+              <a:buFont typeface="Arial" panose="020B0604020202020204" pitchFamily="34" charset="0"/>
+              <a:buChar char="•"/>
+            </a:pPr>
+            <a:r>
+              <a:rPr lang="en-US" dirty="0"/>
+              <a:t> The largest percentage identifies as White, though this has seen a gradual decrease over the years.</a:t>
+            </a:r>
+          </a:p>
+          <a:p>
+            <a:pPr>
+              <a:buFont typeface="Arial" panose="020B0604020202020204" pitchFamily="34" charset="0"/>
+              <a:buChar char="•"/>
+            </a:pPr>
+            <a:r>
+              <a:rPr lang="en-US" b="1" dirty="0"/>
+              <a:t> </a:t>
+            </a:r>
+            <a:r>
+              <a:rPr lang="en-US" dirty="0"/>
+              <a:t>The next consistently higher groups identify as Black/African-American or Hispanic/Latino(any Race).</a:t>
             </a:r>
           </a:p>
         </p:txBody>

</xml_diff>

<commit_message>
Added new age visual for demographics slide.
</commit_message>
<xml_diff>
--- a/Election_Prediction_Presentation.pptx
+++ b/Election_Prediction_Presentation.pptx
@@ -4078,8 +4078,13 @@
             </a:r>
             <a:r>
               <a:rPr lang="en-US" dirty="0"/>
-              <a:t>: Remains consistently between 30 and 40 years across recent election years, showing little variation.</a:t>
-            </a:r>
+              <a:t>: Remains consistently between 30 and 40 years across recent election years, showing </a:t>
+            </a:r>
+            <a:r>
+              <a:rPr lang="en-US"/>
+              <a:t>gradual growth.</a:t>
+            </a:r>
+            <a:endParaRPr lang="en-US" dirty="0"/>
           </a:p>
           <a:p>
             <a:pPr>
@@ -4097,6 +4102,42 @@
           </a:p>
         </p:txBody>
       </p:sp>
+      <p:pic>
+        <p:nvPicPr>
+          <p:cNvPr id="5" name="Picture 4" descr="A graph with a line going up&#10;&#10;Description automatically generated">
+            <a:extLst>
+              <a:ext uri="{FF2B5EF4-FFF2-40B4-BE49-F238E27FC236}">
+                <a16:creationId xmlns:a16="http://schemas.microsoft.com/office/drawing/2014/main" id="{B13B2F9A-DB17-357C-8B5E-FAB58ED5C264}"/>
+              </a:ext>
+            </a:extLst>
+          </p:cNvPr>
+          <p:cNvPicPr>
+            <a:picLocks noChangeAspect="1"/>
+          </p:cNvPicPr>
+          <p:nvPr/>
+        </p:nvPicPr>
+        <p:blipFill>
+          <a:blip r:embed="rId2">
+            <a:extLst>
+              <a:ext uri="{28A0092B-C50C-407E-A947-70E740481C1C}">
+                <a14:useLocalDpi xmlns:a14="http://schemas.microsoft.com/office/drawing/2010/main" val="0"/>
+              </a:ext>
+            </a:extLst>
+          </a:blip>
+          <a:stretch>
+            <a:fillRect/>
+          </a:stretch>
+        </p:blipFill>
+        <p:spPr>
+          <a:xfrm>
+            <a:off x="5400830" y="1578120"/>
+            <a:ext cx="6270243" cy="3762146"/>
+          </a:xfrm>
+          <a:prstGeom prst="rect">
+            <a:avLst/>
+          </a:prstGeom>
+        </p:spPr>
+      </p:pic>
     </p:spTree>
     <p:extLst>
       <p:ext uri="{BB962C8B-B14F-4D97-AF65-F5344CB8AC3E}">

</xml_diff>